<commit_message>
little move of LoLaCo
</commit_message>
<xml_diff>
--- a/MoLOverviewPoster2015.pptx
+++ b/MoLOverviewPoster2015.pptx
@@ -5932,7 +5932,7 @@
         </p:nvSpPr>
         <p:spPr>
           <a:xfrm flipH="1" flipV="1">
-            <a:off x="4953821" y="20071774"/>
+            <a:off x="4820137" y="20172043"/>
             <a:ext cx="1031399" cy="0"/>
           </a:xfrm>
           <a:prstGeom prst="line">
@@ -7045,7 +7045,7 @@
         </p:nvSpPr>
         <p:spPr>
           <a:xfrm>
-            <a:off x="508831" y="2892273"/>
+            <a:off x="1143830" y="3025965"/>
             <a:ext cx="3422879" cy="3258412"/>
           </a:xfrm>
           <a:prstGeom prst="ellipse">
@@ -7138,7 +7138,7 @@
         </p:nvSpPr>
         <p:spPr>
           <a:xfrm>
-            <a:off x="1463782" y="2676558"/>
+            <a:off x="2098781" y="2810250"/>
             <a:ext cx="1497972" cy="1204325"/>
           </a:xfrm>
           <a:prstGeom prst="rect">

</xml_diff>